<commit_message>
Update BMS_Lab_Funktionsdesign und Implementierung.pptx
</commit_message>
<xml_diff>
--- a/BMS_Lab_Funktionsdesign und Implementierung.pptx
+++ b/BMS_Lab_Funktionsdesign und Implementierung.pptx
@@ -1115,7 +1115,7 @@
               <a:pPr>
                 <a:defRPr/>
               </a:pPr>
-              <a:t>‹Nr.›</a:t>
+              <a:t>‹#›</a:t>
             </a:fld>
             <a:endParaRPr lang="de-DE"/>
           </a:p>
@@ -1676,7 +1676,7 @@
               <a:pPr>
                 <a:defRPr/>
               </a:pPr>
-              <a:t>‹Nr.›</a:t>
+              <a:t>‹#›</a:t>
             </a:fld>
             <a:endParaRPr lang="de-DE"/>
           </a:p>
@@ -1900,7 +1900,7 @@
               <a:pPr>
                 <a:defRPr/>
               </a:pPr>
-              <a:t>‹Nr.›</a:t>
+              <a:t>‹#›</a:t>
             </a:fld>
             <a:endParaRPr lang="de-DE"/>
           </a:p>
@@ -2166,7 +2166,7 @@
               <a:pPr>
                 <a:defRPr/>
               </a:pPr>
-              <a:t>‹Nr.›</a:t>
+              <a:t>‹#›</a:t>
             </a:fld>
             <a:endParaRPr lang="de-DE"/>
           </a:p>
@@ -2428,7 +2428,7 @@
               <a:pPr>
                 <a:defRPr/>
               </a:pPr>
-              <a:t>‹Nr.›</a:t>
+              <a:t>‹#›</a:t>
             </a:fld>
             <a:endParaRPr lang="de-DE"/>
           </a:p>
@@ -2618,7 +2618,7 @@
               <a:pPr>
                 <a:defRPr/>
               </a:pPr>
-              <a:t>‹Nr.›</a:t>
+              <a:t>‹#›</a:t>
             </a:fld>
             <a:endParaRPr lang="de-DE"/>
           </a:p>
@@ -2885,7 +2885,7 @@
               <a:pPr>
                 <a:defRPr/>
               </a:pPr>
-              <a:t>‹Nr.›</a:t>
+              <a:t>‹#›</a:t>
             </a:fld>
             <a:endParaRPr lang="de-DE"/>
           </a:p>
@@ -3192,7 +3192,7 @@
               <a:pPr>
                 <a:defRPr/>
               </a:pPr>
-              <a:t>‹Nr.›</a:t>
+              <a:t>‹#›</a:t>
             </a:fld>
             <a:endParaRPr lang="de-DE"/>
           </a:p>
@@ -3633,7 +3633,7 @@
               <a:pPr>
                 <a:defRPr/>
               </a:pPr>
-              <a:t>‹Nr.›</a:t>
+              <a:t>‹#›</a:t>
             </a:fld>
             <a:endParaRPr lang="de-DE"/>
           </a:p>
@@ -3772,7 +3772,7 @@
               <a:pPr>
                 <a:defRPr/>
               </a:pPr>
-              <a:t>‹Nr.›</a:t>
+              <a:t>‹#›</a:t>
             </a:fld>
             <a:endParaRPr lang="de-DE"/>
           </a:p>
@@ -3889,7 +3889,7 @@
               <a:pPr>
                 <a:defRPr/>
               </a:pPr>
-              <a:t>‹Nr.›</a:t>
+              <a:t>‹#›</a:t>
             </a:fld>
             <a:endParaRPr lang="de-DE"/>
           </a:p>
@@ -4186,7 +4186,7 @@
               <a:pPr>
                 <a:defRPr/>
               </a:pPr>
-              <a:t>‹Nr.›</a:t>
+              <a:t>‹#›</a:t>
             </a:fld>
             <a:endParaRPr lang="de-DE"/>
           </a:p>
@@ -4415,7 +4415,7 @@
               <a:pPr>
                 <a:defRPr/>
               </a:pPr>
-              <a:t>‹Nr.›</a:t>
+              <a:t>‹#›</a:t>
             </a:fld>
             <a:endParaRPr lang="de-DE"/>
           </a:p>
@@ -4692,7 +4692,7 @@
               <a:pPr>
                 <a:defRPr/>
               </a:pPr>
-              <a:t>‹Nr.›</a:t>
+              <a:t>‹#›</a:t>
             </a:fld>
             <a:endParaRPr lang="de-DE"/>
           </a:p>
@@ -4882,7 +4882,7 @@
               <a:pPr>
                 <a:defRPr/>
               </a:pPr>
-              <a:t>‹Nr.›</a:t>
+              <a:t>‹#›</a:t>
             </a:fld>
             <a:endParaRPr lang="de-DE"/>
           </a:p>
@@ -5082,7 +5082,7 @@
               <a:pPr>
                 <a:defRPr/>
               </a:pPr>
-              <a:t>‹Nr.›</a:t>
+              <a:t>‹#›</a:t>
             </a:fld>
             <a:endParaRPr lang="de-DE"/>
           </a:p>
@@ -5221,7 +5221,7 @@
               <a:pPr>
                 <a:defRPr/>
               </a:pPr>
-              <a:t>‹Nr.›</a:t>
+              <a:t>‹#›</a:t>
             </a:fld>
             <a:endParaRPr lang="de-DE"/>
           </a:p>
@@ -5522,7 +5522,7 @@
               <a:pPr>
                 <a:defRPr/>
               </a:pPr>
-              <a:t>‹Nr.›</a:t>
+              <a:t>‹#›</a:t>
             </a:fld>
             <a:endParaRPr lang="de-DE"/>
           </a:p>
@@ -5863,7 +5863,7 @@
               <a:pPr>
                 <a:defRPr/>
               </a:pPr>
-              <a:t>‹Nr.›</a:t>
+              <a:t>‹#›</a:t>
             </a:fld>
             <a:endParaRPr lang="de-DE"/>
           </a:p>
@@ -6338,7 +6338,7 @@
               <a:pPr>
                 <a:defRPr/>
               </a:pPr>
-              <a:t>‹Nr.›</a:t>
+              <a:t>‹#›</a:t>
             </a:fld>
             <a:endParaRPr lang="de-DE"/>
           </a:p>
@@ -6511,7 +6511,7 @@
               <a:pPr>
                 <a:defRPr/>
               </a:pPr>
-              <a:t>‹Nr.›</a:t>
+              <a:t>‹#›</a:t>
             </a:fld>
             <a:endParaRPr lang="de-DE"/>
           </a:p>
@@ -6662,7 +6662,7 @@
               <a:pPr>
                 <a:defRPr/>
               </a:pPr>
-              <a:t>‹Nr.›</a:t>
+              <a:t>‹#›</a:t>
             </a:fld>
             <a:endParaRPr lang="de-DE"/>
           </a:p>
@@ -6993,7 +6993,7 @@
               <a:pPr>
                 <a:defRPr/>
               </a:pPr>
-              <a:t>‹Nr.›</a:t>
+              <a:t>‹#›</a:t>
             </a:fld>
             <a:endParaRPr lang="de-DE"/>
           </a:p>
@@ -7304,7 +7304,7 @@
               <a:pPr>
                 <a:defRPr/>
               </a:pPr>
-              <a:t>‹Nr.›</a:t>
+              <a:t>‹#›</a:t>
             </a:fld>
             <a:endParaRPr lang="de-DE"/>
           </a:p>
@@ -7555,7 +7555,7 @@
               <a:pPr>
                 <a:defRPr/>
               </a:pPr>
-              <a:t>‹Nr.›</a:t>
+              <a:t>‹#›</a:t>
             </a:fld>
             <a:endParaRPr lang="de-DE"/>
           </a:p>
@@ -8323,7 +8323,7 @@
               <a:pPr>
                 <a:defRPr/>
               </a:pPr>
-              <a:t>‹Nr.›</a:t>
+              <a:t>‹#›</a:t>
             </a:fld>
             <a:endParaRPr lang="de-DE"/>
           </a:p>
@@ -15797,21 +15797,6 @@
 </file>
 
 <file path=customXml/item1.xml><?xml version="1.0" encoding="utf-8"?>
-<p:properties xmlns:p="http://schemas.microsoft.com/office/2006/metadata/properties" xmlns:xsi="http://www.w3.org/2001/XMLSchema-instance" xmlns:pc="http://schemas.microsoft.com/office/infopath/2007/PartnerControls">
-  <documentManagement/>
-</p:properties>
-</file>
-
-<file path=customXml/item2.xml><?xml version="1.0" encoding="utf-8"?>
-<?mso-contentType ?>
-<FormTemplates xmlns="http://schemas.microsoft.com/sharepoint/v3/contenttype/forms">
-  <Display>DocumentLibraryForm</Display>
-  <Edit>DocumentLibraryForm</Edit>
-  <New>DocumentLibraryForm</New>
-</FormTemplates>
-</file>
-
-<file path=customXml/item3.xml><?xml version="1.0" encoding="utf-8"?>
 <ct:contentTypeSchema xmlns:ct="http://schemas.microsoft.com/office/2006/metadata/contentType" xmlns:ma="http://schemas.microsoft.com/office/2006/metadata/properties/metaAttributes" ct:_="" ma:_="" ma:contentTypeName="Dokument" ma:contentTypeID="0x01010078C5E6C582D1AA43BAF27751C3D140EA" ma:contentTypeVersion="14" ma:contentTypeDescription="Ein neues Dokument erstellen." ma:contentTypeScope="" ma:versionID="dfd9e3120996f1ece0247dfcf46c721e">
   <xsd:schema xmlns:xsd="http://www.w3.org/2001/XMLSchema" xmlns:xs="http://www.w3.org/2001/XMLSchema" xmlns:p="http://schemas.microsoft.com/office/2006/metadata/properties" xmlns:ns3="ad8f1922-f31f-471d-9bd3-92f5adc1fa65" xmlns:ns4="cb03da72-cbb2-43d4-ab44-22c439ee9e73" targetNamespace="http://schemas.microsoft.com/office/2006/metadata/properties" ma:root="true" ma:fieldsID="dfc2393b50b106d7e5d5fcfe0aa0e392" ns3:_="" ns4:_="">
     <xsd:import namespace="ad8f1922-f31f-471d-9bd3-92f5adc1fa65"/>
@@ -16040,7 +16025,41 @@
 </ct:contentTypeSchema>
 </file>
 
+<file path=customXml/item2.xml><?xml version="1.0" encoding="utf-8"?>
+<p:properties xmlns:p="http://schemas.microsoft.com/office/2006/metadata/properties" xmlns:xsi="http://www.w3.org/2001/XMLSchema-instance" xmlns:pc="http://schemas.microsoft.com/office/infopath/2007/PartnerControls">
+  <documentManagement/>
+</p:properties>
+</file>
+
+<file path=customXml/item3.xml><?xml version="1.0" encoding="utf-8"?>
+<?mso-contentType ?>
+<FormTemplates xmlns="http://schemas.microsoft.com/sharepoint/v3/contenttype/forms">
+  <Display>DocumentLibraryForm</Display>
+  <Edit>DocumentLibraryForm</Edit>
+  <New>DocumentLibraryForm</New>
+</FormTemplates>
+</file>
+
 <file path=customXml/itemProps1.xml><?xml version="1.0" encoding="utf-8"?>
+<ds:datastoreItem xmlns:ds="http://schemas.openxmlformats.org/officeDocument/2006/customXml" ds:itemID="{ADEC74E6-248B-485E-9A08-90BF5DE98A98}">
+  <ds:schemaRefs>
+    <ds:schemaRef ds:uri="ad8f1922-f31f-471d-9bd3-92f5adc1fa65"/>
+    <ds:schemaRef ds:uri="cb03da72-cbb2-43d4-ab44-22c439ee9e73"/>
+    <ds:schemaRef ds:uri="http://purl.org/dc/elements/1.1/"/>
+    <ds:schemaRef ds:uri="http://purl.org/dc/terms/"/>
+    <ds:schemaRef ds:uri="http://schemas.microsoft.com/internal/obd"/>
+    <ds:schemaRef ds:uri="http://schemas.microsoft.com/office/2006/documentManagement/types"/>
+    <ds:schemaRef ds:uri="http://schemas.microsoft.com/office/2006/metadata/contentType"/>
+    <ds:schemaRef ds:uri="http://schemas.microsoft.com/office/2006/metadata/properties"/>
+    <ds:schemaRef ds:uri="http://schemas.microsoft.com/office/2006/metadata/properties/metaAttributes"/>
+    <ds:schemaRef ds:uri="http://schemas.microsoft.com/office/infopath/2007/PartnerControls"/>
+    <ds:schemaRef ds:uri="http://schemas.openxmlformats.org/package/2006/metadata/core-properties"/>
+    <ds:schemaRef ds:uri="http://www.w3.org/2001/XMLSchema"/>
+  </ds:schemaRefs>
+</ds:datastoreItem>
+</file>
+
+<file path=customXml/itemProps2.xml><?xml version="1.0" encoding="utf-8"?>
 <ds:datastoreItem xmlns:ds="http://schemas.openxmlformats.org/officeDocument/2006/customXml" ds:itemID="{7EF94F45-2E23-4321-884B-70609BDD8A2C}">
   <ds:schemaRefs>
     <ds:schemaRef ds:uri="ad8f1922-f31f-471d-9bd3-92f5adc1fa65"/>
@@ -16057,29 +16076,10 @@
 </ds:datastoreItem>
 </file>
 
-<file path=customXml/itemProps2.xml><?xml version="1.0" encoding="utf-8"?>
+<file path=customXml/itemProps3.xml><?xml version="1.0" encoding="utf-8"?>
 <ds:datastoreItem xmlns:ds="http://schemas.openxmlformats.org/officeDocument/2006/customXml" ds:itemID="{32BC2F3B-C3DE-4DAB-ABE0-1C8C43DCF9C1}">
   <ds:schemaRefs>
     <ds:schemaRef ds:uri="http://schemas.microsoft.com/sharepoint/v3/contenttype/forms"/>
   </ds:schemaRefs>
 </ds:datastoreItem>
-</file>
-
-<file path=customXml/itemProps3.xml><?xml version="1.0" encoding="utf-8"?>
-<ds:datastoreItem xmlns:ds="http://schemas.openxmlformats.org/officeDocument/2006/customXml" ds:itemID="{ADEC74E6-248B-485E-9A08-90BF5DE98A98}">
-  <ds:schemaRefs>
-    <ds:schemaRef ds:uri="ad8f1922-f31f-471d-9bd3-92f5adc1fa65"/>
-    <ds:schemaRef ds:uri="cb03da72-cbb2-43d4-ab44-22c439ee9e73"/>
-    <ds:schemaRef ds:uri="http://purl.org/dc/elements/1.1/"/>
-    <ds:schemaRef ds:uri="http://purl.org/dc/terms/"/>
-    <ds:schemaRef ds:uri="http://schemas.microsoft.com/internal/obd"/>
-    <ds:schemaRef ds:uri="http://schemas.microsoft.com/office/2006/documentManagement/types"/>
-    <ds:schemaRef ds:uri="http://schemas.microsoft.com/office/2006/metadata/contentType"/>
-    <ds:schemaRef ds:uri="http://schemas.microsoft.com/office/2006/metadata/properties"/>
-    <ds:schemaRef ds:uri="http://schemas.microsoft.com/office/2006/metadata/properties/metaAttributes"/>
-    <ds:schemaRef ds:uri="http://schemas.microsoft.com/office/infopath/2007/PartnerControls"/>
-    <ds:schemaRef ds:uri="http://schemas.openxmlformats.org/package/2006/metadata/core-properties"/>
-    <ds:schemaRef ds:uri="http://www.w3.org/2001/XMLSchema"/>
-  </ds:schemaRefs>
-</ds:datastoreItem>
 </file>
</xml_diff>